<commit_message>
updated presentation plus vader examples notebook
</commit_message>
<xml_diff>
--- a/Draft Presentation.pptx
+++ b/Draft Presentation.pptx
@@ -5,19 +5,22 @@
     <p:sldMasterId id="2147483648" r:id="rId1"/>
   </p:sldMasterIdLst>
   <p:notesMasterIdLst>
-    <p:notesMasterId r:id="rId12"/>
+    <p:notesMasterId r:id="rId15"/>
   </p:notesMasterIdLst>
   <p:sldIdLst>
     <p:sldId id="256" r:id="rId2"/>
     <p:sldId id="257" r:id="rId3"/>
     <p:sldId id="258" r:id="rId4"/>
     <p:sldId id="259" r:id="rId5"/>
-    <p:sldId id="260" r:id="rId6"/>
-    <p:sldId id="264" r:id="rId7"/>
-    <p:sldId id="261" r:id="rId8"/>
-    <p:sldId id="262" r:id="rId9"/>
-    <p:sldId id="263" r:id="rId10"/>
-    <p:sldId id="265" r:id="rId11"/>
+    <p:sldId id="266" r:id="rId6"/>
+    <p:sldId id="267" r:id="rId7"/>
+    <p:sldId id="268" r:id="rId8"/>
+    <p:sldId id="260" r:id="rId9"/>
+    <p:sldId id="264" r:id="rId10"/>
+    <p:sldId id="261" r:id="rId11"/>
+    <p:sldId id="262" r:id="rId12"/>
+    <p:sldId id="263" r:id="rId13"/>
+    <p:sldId id="265" r:id="rId14"/>
   </p:sldIdLst>
   <p:sldSz cx="12192000" cy="6858000"/>
   <p:notesSz cx="6858000" cy="9144000"/>
@@ -116,6 +119,11 @@
       </a:defRPr>
     </a:lvl9pPr>
   </p:defaultTextStyle>
+  <p:extLst>
+    <p:ext uri="{EFAFB233-063F-42B5-8137-9DF3F51BA10A}">
+      <p15:sldGuideLst xmlns:p15="http://schemas.microsoft.com/office/powerpoint/2012/main"/>
+    </p:ext>
+  </p:extLst>
 </p:presentation>
 </file>
 
@@ -588,6 +596,220 @@
 </p:notes>
 </file>
 
+<file path=ppt/notesSlides/notesSlide2.xml><?xml version="1.0" encoding="utf-8"?>
+<p:notes xmlns:a="http://schemas.openxmlformats.org/drawingml/2006/main" xmlns:r="http://schemas.openxmlformats.org/officeDocument/2006/relationships" xmlns:p="http://schemas.openxmlformats.org/presentationml/2006/main">
+  <p:cSld>
+    <p:spTree>
+      <p:nvGrpSpPr>
+        <p:cNvPr id="1" name=""/>
+        <p:cNvGrpSpPr/>
+        <p:nvPr/>
+      </p:nvGrpSpPr>
+      <p:grpSpPr>
+        <a:xfrm>
+          <a:off x="0" y="0"/>
+          <a:ext cx="0" cy="0"/>
+          <a:chOff x="0" y="0"/>
+          <a:chExt cx="0" cy="0"/>
+        </a:xfrm>
+      </p:grpSpPr>
+      <p:sp>
+        <p:nvSpPr>
+          <p:cNvPr id="2" name="Slide Image Placeholder 1"/>
+          <p:cNvSpPr>
+            <a:spLocks noGrp="1" noRot="1" noChangeAspect="1"/>
+          </p:cNvSpPr>
+          <p:nvPr>
+            <p:ph type="sldImg"/>
+          </p:nvPr>
+        </p:nvSpPr>
+        <p:spPr/>
+      </p:sp>
+      <p:sp>
+        <p:nvSpPr>
+          <p:cNvPr id="3" name="Notes Placeholder 2"/>
+          <p:cNvSpPr>
+            <a:spLocks noGrp="1"/>
+          </p:cNvSpPr>
+          <p:nvPr>
+            <p:ph type="body" idx="1"/>
+          </p:nvPr>
+        </p:nvSpPr>
+        <p:spPr/>
+        <p:txBody>
+          <a:bodyPr/>
+          <a:lstStyle/>
+          <a:p>
+            <a:r>
+              <a:rPr lang="en-US" dirty="0"/>
+              <a:t>Sample one graph, 4 lines (positive, negative, neutral, compound)</a:t>
+            </a:r>
+          </a:p>
+          <a:p>
+            <a:pPr marL="0" marR="0" lvl="0" indent="0" algn="l" defTabSz="914400" rtl="0" eaLnBrk="1" fontAlgn="auto" latinLnBrk="0" hangingPunct="1">
+              <a:lnSpc>
+                <a:spcPct val="100000"/>
+              </a:lnSpc>
+              <a:spcBef>
+                <a:spcPts val="0"/>
+              </a:spcBef>
+              <a:spcAft>
+                <a:spcPts val="0"/>
+              </a:spcAft>
+              <a:buClrTx/>
+              <a:buSzTx/>
+              <a:buFontTx/>
+              <a:buNone/>
+              <a:tabLst/>
+              <a:defRPr/>
+            </a:pPr>
+            <a:r>
+              <a:rPr lang="en-US" dirty="0"/>
+              <a:t>Sample two graph, 4 lines (positive, negative, neutral, compound)</a:t>
+            </a:r>
+          </a:p>
+          <a:p>
+            <a:pPr marL="0" marR="0" lvl="0" indent="0" algn="l" defTabSz="914400" rtl="0" eaLnBrk="1" fontAlgn="auto" latinLnBrk="0" hangingPunct="1">
+              <a:lnSpc>
+                <a:spcPct val="100000"/>
+              </a:lnSpc>
+              <a:spcBef>
+                <a:spcPts val="0"/>
+              </a:spcBef>
+              <a:spcAft>
+                <a:spcPts val="0"/>
+              </a:spcAft>
+              <a:buClrTx/>
+              <a:buSzTx/>
+              <a:buFontTx/>
+              <a:buNone/>
+              <a:tabLst/>
+              <a:defRPr/>
+            </a:pPr>
+            <a:r>
+              <a:rPr lang="en-US" dirty="0"/>
+              <a:t>Sample three graph, 4 lines (positive, negative, neutral, compound)</a:t>
+            </a:r>
+          </a:p>
+          <a:p>
+            <a:endParaRPr lang="en-US" dirty="0"/>
+          </a:p>
+          <a:p>
+            <a:r>
+              <a:rPr lang="en-US" dirty="0"/>
+              <a:t>Negative of all three, and average in one graph</a:t>
+            </a:r>
+          </a:p>
+          <a:p>
+            <a:pPr marL="0" marR="0" lvl="0" indent="0" algn="l" defTabSz="914400" rtl="0" eaLnBrk="1" fontAlgn="auto" latinLnBrk="0" hangingPunct="1">
+              <a:lnSpc>
+                <a:spcPct val="100000"/>
+              </a:lnSpc>
+              <a:spcBef>
+                <a:spcPts val="0"/>
+              </a:spcBef>
+              <a:spcAft>
+                <a:spcPts val="0"/>
+              </a:spcAft>
+              <a:buClrTx/>
+              <a:buSzTx/>
+              <a:buFontTx/>
+              <a:buNone/>
+              <a:tabLst/>
+              <a:defRPr/>
+            </a:pPr>
+            <a:r>
+              <a:rPr lang="en-US" dirty="0"/>
+              <a:t>Positive of all three, and average in one graph</a:t>
+            </a:r>
+          </a:p>
+          <a:p>
+            <a:pPr marL="0" marR="0" lvl="0" indent="0" algn="l" defTabSz="914400" rtl="0" eaLnBrk="1" fontAlgn="auto" latinLnBrk="0" hangingPunct="1">
+              <a:lnSpc>
+                <a:spcPct val="100000"/>
+              </a:lnSpc>
+              <a:spcBef>
+                <a:spcPts val="0"/>
+              </a:spcBef>
+              <a:spcAft>
+                <a:spcPts val="0"/>
+              </a:spcAft>
+              <a:buClrTx/>
+              <a:buSzTx/>
+              <a:buFontTx/>
+              <a:buNone/>
+              <a:tabLst/>
+              <a:defRPr/>
+            </a:pPr>
+            <a:r>
+              <a:rPr lang="en-US" dirty="0"/>
+              <a:t>Neutral of all three, and average in one graph</a:t>
+            </a:r>
+          </a:p>
+          <a:p>
+            <a:pPr marL="0" marR="0" lvl="0" indent="0" algn="l" defTabSz="914400" rtl="0" eaLnBrk="1" fontAlgn="auto" latinLnBrk="0" hangingPunct="1">
+              <a:lnSpc>
+                <a:spcPct val="100000"/>
+              </a:lnSpc>
+              <a:spcBef>
+                <a:spcPts val="0"/>
+              </a:spcBef>
+              <a:spcAft>
+                <a:spcPts val="0"/>
+              </a:spcAft>
+              <a:buClrTx/>
+              <a:buSzTx/>
+              <a:buFontTx/>
+              <a:buNone/>
+              <a:tabLst/>
+              <a:defRPr/>
+            </a:pPr>
+            <a:r>
+              <a:rPr lang="en-US" dirty="0"/>
+              <a:t>Compound of all three, and average in one graph</a:t>
+            </a:r>
+          </a:p>
+          <a:p>
+            <a:endParaRPr lang="en-US" dirty="0"/>
+          </a:p>
+        </p:txBody>
+      </p:sp>
+      <p:sp>
+        <p:nvSpPr>
+          <p:cNvPr id="4" name="Slide Number Placeholder 3"/>
+          <p:cNvSpPr>
+            <a:spLocks noGrp="1"/>
+          </p:cNvSpPr>
+          <p:nvPr>
+            <p:ph type="sldNum" sz="quarter" idx="10"/>
+          </p:nvPr>
+        </p:nvSpPr>
+        <p:spPr/>
+        <p:txBody>
+          <a:bodyPr/>
+          <a:lstStyle/>
+          <a:p>
+            <a:fld id="{FA855EFC-39B9-104D-AE59-30A96B5EA9FF}" type="slidenum">
+              <a:rPr lang="en-US" smtClean="0"/>
+              <a:t>10</a:t>
+            </a:fld>
+            <a:endParaRPr lang="en-US"/>
+          </a:p>
+        </p:txBody>
+      </p:sp>
+    </p:spTree>
+    <p:extLst>
+      <p:ext uri="{BB962C8B-B14F-4D97-AF65-F5344CB8AC3E}">
+        <p14:creationId xmlns:p14="http://schemas.microsoft.com/office/powerpoint/2010/main" val="404018838"/>
+      </p:ext>
+    </p:extLst>
+  </p:cSld>
+  <p:clrMapOvr>
+    <a:masterClrMapping/>
+  </p:clrMapOvr>
+</p:notes>
+</file>
+
 <file path=ppt/slideLayouts/slideLayout1.xml><?xml version="1.0" encoding="utf-8"?>
 <p:sldLayout xmlns:a="http://schemas.openxmlformats.org/drawingml/2006/main" xmlns:r="http://schemas.openxmlformats.org/officeDocument/2006/relationships" xmlns:p="http://schemas.openxmlformats.org/presentationml/2006/main" type="title" preserve="1">
   <p:cSld name="Title Slide">
@@ -862,7 +1084,7 @@
           <a:p>
             <a:fld id="{78ABE3C1-DBE1-495D-B57B-2849774B866A}" type="datetimeFigureOut">
               <a:rPr lang="en-US" dirty="0"/>
-              <a:t>7/25/18</a:t>
+              <a:t>7/26/18</a:t>
             </a:fld>
             <a:endParaRPr lang="en-US" dirty="0"/>
           </a:p>
@@ -1271,7 +1493,7 @@
           <a:p>
             <a:fld id="{446C117F-5CCF-4837-BE5F-2B92066CAFAF}" type="datetimeFigureOut">
               <a:rPr lang="en-US" dirty="0"/>
-              <a:t>7/25/18</a:t>
+              <a:t>7/26/18</a:t>
             </a:fld>
             <a:endParaRPr lang="en-US" dirty="0"/>
           </a:p>
@@ -1602,7 +1824,7 @@
           <a:p>
             <a:fld id="{84EB90BD-B6CE-46B7-997F-7313B992CCDC}" type="datetimeFigureOut">
               <a:rPr lang="en-US" dirty="0"/>
-              <a:t>7/25/18</a:t>
+              <a:t>7/26/18</a:t>
             </a:fld>
             <a:endParaRPr lang="en-US" dirty="0"/>
           </a:p>
@@ -2002,7 +2224,7 @@
           <a:p>
             <a:fld id="{CDB9D11F-B188-461D-B23F-39381795C052}" type="datetimeFigureOut">
               <a:rPr lang="en-US" dirty="0"/>
-              <a:t>7/25/18</a:t>
+              <a:t>7/26/18</a:t>
             </a:fld>
             <a:endParaRPr lang="en-US" dirty="0"/>
           </a:p>
@@ -2565,7 +2787,7 @@
           <a:p>
             <a:fld id="{52E6D8D9-55A2-4063-B0F3-121F44549695}" type="datetimeFigureOut">
               <a:rPr lang="en-US" dirty="0"/>
-              <a:t>7/25/18</a:t>
+              <a:t>7/26/18</a:t>
             </a:fld>
             <a:endParaRPr lang="en-US" dirty="0"/>
           </a:p>
@@ -3241,7 +3463,7 @@
           <a:p>
             <a:fld id="{D4B24536-994D-4021-A283-9F449C0DB509}" type="datetimeFigureOut">
               <a:rPr lang="en-US" dirty="0"/>
-              <a:t>7/25/18</a:t>
+              <a:t>7/26/18</a:t>
             </a:fld>
             <a:endParaRPr lang="en-US" dirty="0"/>
           </a:p>
@@ -4149,7 +4371,7 @@
           <a:p>
             <a:fld id="{3CBBBB78-C96F-47B7-AB17-D852CA960AC9}" type="datetimeFigureOut">
               <a:rPr lang="en-US" dirty="0"/>
-              <a:t>7/25/18</a:t>
+              <a:t>7/26/18</a:t>
             </a:fld>
             <a:endParaRPr lang="en-US" dirty="0"/>
           </a:p>
@@ -4457,7 +4679,7 @@
           <a:p>
             <a:fld id="{1FA3F48C-C7C6-4055-9F49-3777875E72AE}" type="datetimeFigureOut">
               <a:rPr lang="en-US" dirty="0"/>
-              <a:t>7/25/18</a:t>
+              <a:t>7/26/18</a:t>
             </a:fld>
             <a:endParaRPr lang="en-US" dirty="0"/>
           </a:p>
@@ -4716,7 +4938,7 @@
           <a:p>
             <a:fld id="{6178E61D-D431-422C-9764-11DAFE33AB63}" type="datetimeFigureOut">
               <a:rPr lang="en-US" dirty="0"/>
-              <a:t>7/25/18</a:t>
+              <a:t>7/26/18</a:t>
             </a:fld>
             <a:endParaRPr lang="en-US" dirty="0"/>
           </a:p>
@@ -5035,7 +5257,7 @@
           <a:p>
             <a:fld id="{12DE42F4-6EEF-4EF7-8ED4-2208F0F89A08}" type="datetimeFigureOut">
               <a:rPr lang="en-US" dirty="0"/>
-              <a:t>7/25/18</a:t>
+              <a:t>7/26/18</a:t>
             </a:fld>
             <a:endParaRPr lang="en-US" dirty="0"/>
           </a:p>
@@ -5419,7 +5641,7 @@
           <a:p>
             <a:fld id="{30578ACC-22D6-47C1-A373-4FD133E34F3C}" type="datetimeFigureOut">
               <a:rPr lang="en-US" dirty="0"/>
-              <a:t>7/25/18</a:t>
+              <a:t>7/26/18</a:t>
             </a:fld>
             <a:endParaRPr lang="en-US" dirty="0"/>
           </a:p>
@@ -5790,7 +6012,7 @@
           <a:p>
             <a:fld id="{4E5A6C69-6797-4E8A-BF37-F2C3751466E9}" type="datetimeFigureOut">
               <a:rPr lang="en-US" dirty="0"/>
-              <a:t>7/25/18</a:t>
+              <a:t>7/26/18</a:t>
             </a:fld>
             <a:endParaRPr lang="en-US" dirty="0"/>
           </a:p>
@@ -6291,7 +6513,7 @@
           <a:p>
             <a:fld id="{D82014A1-A632-4878-A0D3-F52BA7563730}" type="datetimeFigureOut">
               <a:rPr lang="en-US" dirty="0"/>
-              <a:t>7/25/18</a:t>
+              <a:t>7/26/18</a:t>
             </a:fld>
             <a:endParaRPr lang="en-US" dirty="0"/>
           </a:p>
@@ -6543,7 +6765,7 @@
           <a:p>
             <a:fld id="{CE99F462-093F-4566-844B-4C71F2739DA5}" type="datetimeFigureOut">
               <a:rPr lang="en-US" dirty="0"/>
-              <a:t>7/25/18</a:t>
+              <a:t>7/26/18</a:t>
             </a:fld>
             <a:endParaRPr lang="en-US" dirty="0"/>
           </a:p>
@@ -6701,7 +6923,7 @@
           <a:p>
             <a:fld id="{3D24A7AC-904D-4781-85BA-7D10C17ED021}" type="datetimeFigureOut">
               <a:rPr lang="en-US" dirty="0"/>
-              <a:t>7/25/18</a:t>
+              <a:t>7/26/18</a:t>
             </a:fld>
             <a:endParaRPr lang="en-US" dirty="0"/>
           </a:p>
@@ -7086,7 +7308,7 @@
           <a:p>
             <a:fld id="{E331444B-B92B-4E27-8C94-BB93EAF5CB18}" type="datetimeFigureOut">
               <a:rPr lang="en-US" dirty="0"/>
-              <a:t>7/25/18</a:t>
+              <a:t>7/26/18</a:t>
             </a:fld>
             <a:endParaRPr lang="en-US" dirty="0"/>
           </a:p>
@@ -7490,7 +7712,7 @@
           <a:p>
             <a:fld id="{363EFA5E-FA76-400D-B3DC-F0BA90E6D107}" type="datetimeFigureOut">
               <a:rPr lang="en-US" dirty="0"/>
-              <a:t>7/25/18</a:t>
+              <a:t>7/26/18</a:t>
             </a:fld>
             <a:endParaRPr lang="en-US" dirty="0"/>
           </a:p>
@@ -7729,7 +7951,7 @@
           <a:p>
             <a:fld id="{9D6E9DEC-419B-4CC5-A080-3B06BD5A8291}" type="datetimeFigureOut">
               <a:rPr lang="en-US" dirty="0"/>
-              <a:t>7/25/18</a:t>
+              <a:t>7/26/18</a:t>
             </a:fld>
             <a:endParaRPr lang="en-US" dirty="0"/>
           </a:p>
@@ -8160,7 +8382,7 @@
           <a:p>
             <a:r>
               <a:rPr lang="en-US" dirty="0"/>
-              <a:t>Are Pop Songs Becoming Suspicious?</a:t>
+              <a:t>50 Years of Music Trends</a:t>
             </a:r>
           </a:p>
         </p:txBody>
@@ -8188,7 +8410,7 @@
           <a:p>
             <a:r>
               <a:rPr lang="en-US" dirty="0"/>
-              <a:t>An Analysis of Top Songs Using Vader Sentiment Analysis</a:t>
+              <a:t>Are songs becoming more negative or positive? A sentiment analysis of music.</a:t>
             </a:r>
           </a:p>
         </p:txBody>
@@ -8228,6 +8450,366 @@
           <p:cNvPr id="2" name="Title 1">
             <a:extLst>
               <a:ext uri="{FF2B5EF4-FFF2-40B4-BE49-F238E27FC236}">
+                <a16:creationId xmlns:a16="http://schemas.microsoft.com/office/drawing/2014/main" id="{6D3BBD76-F2F9-6647-A495-7818A8CE541A}"/>
+              </a:ext>
+            </a:extLst>
+          </p:cNvPr>
+          <p:cNvSpPr>
+            <a:spLocks noGrp="1"/>
+          </p:cNvSpPr>
+          <p:nvPr>
+            <p:ph type="title"/>
+          </p:nvPr>
+        </p:nvSpPr>
+        <p:spPr/>
+        <p:txBody>
+          <a:bodyPr/>
+          <a:lstStyle/>
+          <a:p>
+            <a:r>
+              <a:rPr lang="en-US" dirty="0"/>
+              <a:t>Results</a:t>
+            </a:r>
+          </a:p>
+        </p:txBody>
+      </p:sp>
+      <p:sp>
+        <p:nvSpPr>
+          <p:cNvPr id="3" name="Content Placeholder 2">
+            <a:extLst>
+              <a:ext uri="{FF2B5EF4-FFF2-40B4-BE49-F238E27FC236}">
+                <a16:creationId xmlns:a16="http://schemas.microsoft.com/office/drawing/2014/main" id="{A0408887-0C2A-A948-8614-440236A0BA58}"/>
+              </a:ext>
+            </a:extLst>
+          </p:cNvPr>
+          <p:cNvSpPr>
+            <a:spLocks noGrp="1"/>
+          </p:cNvSpPr>
+          <p:nvPr>
+            <p:ph idx="1"/>
+          </p:nvPr>
+        </p:nvSpPr>
+        <p:spPr/>
+        <p:txBody>
+          <a:bodyPr/>
+          <a:lstStyle/>
+          <a:p>
+            <a:endParaRPr lang="en-US"/>
+          </a:p>
+        </p:txBody>
+      </p:sp>
+    </p:spTree>
+    <p:extLst>
+      <p:ext uri="{BB962C8B-B14F-4D97-AF65-F5344CB8AC3E}">
+        <p14:creationId xmlns:p14="http://schemas.microsoft.com/office/powerpoint/2010/main" val="1496611569"/>
+      </p:ext>
+    </p:extLst>
+  </p:cSld>
+  <p:clrMapOvr>
+    <a:masterClrMapping/>
+  </p:clrMapOvr>
+</p:sld>
+</file>
+
+<file path=ppt/slides/slide11.xml><?xml version="1.0" encoding="utf-8"?>
+<p:sld xmlns:a="http://schemas.openxmlformats.org/drawingml/2006/main" xmlns:r="http://schemas.openxmlformats.org/officeDocument/2006/relationships" xmlns:p="http://schemas.openxmlformats.org/presentationml/2006/main">
+  <p:cSld>
+    <p:spTree>
+      <p:nvGrpSpPr>
+        <p:cNvPr id="1" name=""/>
+        <p:cNvGrpSpPr/>
+        <p:nvPr/>
+      </p:nvGrpSpPr>
+      <p:grpSpPr>
+        <a:xfrm>
+          <a:off x="0" y="0"/>
+          <a:ext cx="0" cy="0"/>
+          <a:chOff x="0" y="0"/>
+          <a:chExt cx="0" cy="0"/>
+        </a:xfrm>
+      </p:grpSpPr>
+      <p:sp>
+        <p:nvSpPr>
+          <p:cNvPr id="2" name="Title 1">
+            <a:extLst>
+              <a:ext uri="{FF2B5EF4-FFF2-40B4-BE49-F238E27FC236}">
+                <a16:creationId xmlns:a16="http://schemas.microsoft.com/office/drawing/2014/main" id="{F9FEC0AD-89F0-684F-A816-C7B640FAE068}"/>
+              </a:ext>
+            </a:extLst>
+          </p:cNvPr>
+          <p:cNvSpPr>
+            <a:spLocks noGrp="1"/>
+          </p:cNvSpPr>
+          <p:nvPr>
+            <p:ph type="title"/>
+          </p:nvPr>
+        </p:nvSpPr>
+        <p:spPr/>
+        <p:txBody>
+          <a:bodyPr/>
+          <a:lstStyle/>
+          <a:p>
+            <a:r>
+              <a:rPr lang="en-US" dirty="0"/>
+              <a:t>Reject or Fail to Reject Null Hypothesis?</a:t>
+            </a:r>
+          </a:p>
+        </p:txBody>
+      </p:sp>
+      <p:sp>
+        <p:nvSpPr>
+          <p:cNvPr id="3" name="Content Placeholder 2">
+            <a:extLst>
+              <a:ext uri="{FF2B5EF4-FFF2-40B4-BE49-F238E27FC236}">
+                <a16:creationId xmlns:a16="http://schemas.microsoft.com/office/drawing/2014/main" id="{732679F2-AC96-6A43-AF67-78466BFBF50F}"/>
+              </a:ext>
+            </a:extLst>
+          </p:cNvPr>
+          <p:cNvSpPr>
+            <a:spLocks noGrp="1"/>
+          </p:cNvSpPr>
+          <p:nvPr>
+            <p:ph idx="1"/>
+          </p:nvPr>
+        </p:nvSpPr>
+        <p:spPr/>
+        <p:txBody>
+          <a:bodyPr/>
+          <a:lstStyle/>
+          <a:p>
+            <a:endParaRPr lang="en-US"/>
+          </a:p>
+        </p:txBody>
+      </p:sp>
+    </p:spTree>
+    <p:extLst>
+      <p:ext uri="{BB962C8B-B14F-4D97-AF65-F5344CB8AC3E}">
+        <p14:creationId xmlns:p14="http://schemas.microsoft.com/office/powerpoint/2010/main" val="3907452845"/>
+      </p:ext>
+    </p:extLst>
+  </p:cSld>
+  <p:clrMapOvr>
+    <a:masterClrMapping/>
+  </p:clrMapOvr>
+</p:sld>
+</file>
+
+<file path=ppt/slides/slide12.xml><?xml version="1.0" encoding="utf-8"?>
+<p:sld xmlns:a="http://schemas.openxmlformats.org/drawingml/2006/main" xmlns:r="http://schemas.openxmlformats.org/officeDocument/2006/relationships" xmlns:p="http://schemas.openxmlformats.org/presentationml/2006/main">
+  <p:cSld>
+    <p:spTree>
+      <p:nvGrpSpPr>
+        <p:cNvPr id="1" name=""/>
+        <p:cNvGrpSpPr/>
+        <p:nvPr/>
+      </p:nvGrpSpPr>
+      <p:grpSpPr>
+        <a:xfrm>
+          <a:off x="0" y="0"/>
+          <a:ext cx="0" cy="0"/>
+          <a:chOff x="0" y="0"/>
+          <a:chExt cx="0" cy="0"/>
+        </a:xfrm>
+      </p:grpSpPr>
+      <p:sp>
+        <p:nvSpPr>
+          <p:cNvPr id="2" name="Title 1">
+            <a:extLst>
+              <a:ext uri="{FF2B5EF4-FFF2-40B4-BE49-F238E27FC236}">
+                <a16:creationId xmlns:a16="http://schemas.microsoft.com/office/drawing/2014/main" id="{34F24FD5-B0AB-C041-B203-48C6B00C06CE}"/>
+              </a:ext>
+            </a:extLst>
+          </p:cNvPr>
+          <p:cNvSpPr>
+            <a:spLocks noGrp="1"/>
+          </p:cNvSpPr>
+          <p:nvPr>
+            <p:ph type="title"/>
+          </p:nvPr>
+        </p:nvSpPr>
+        <p:spPr/>
+        <p:txBody>
+          <a:bodyPr/>
+          <a:lstStyle/>
+          <a:p>
+            <a:r>
+              <a:rPr lang="en-US" dirty="0"/>
+              <a:t>Discussion and Research Limitations</a:t>
+            </a:r>
+          </a:p>
+        </p:txBody>
+      </p:sp>
+      <p:sp>
+        <p:nvSpPr>
+          <p:cNvPr id="3" name="Content Placeholder 2">
+            <a:extLst>
+              <a:ext uri="{FF2B5EF4-FFF2-40B4-BE49-F238E27FC236}">
+                <a16:creationId xmlns:a16="http://schemas.microsoft.com/office/drawing/2014/main" id="{D42AB724-4389-274E-9B8F-133F50A03502}"/>
+              </a:ext>
+            </a:extLst>
+          </p:cNvPr>
+          <p:cNvSpPr>
+            <a:spLocks noGrp="1"/>
+          </p:cNvSpPr>
+          <p:nvPr>
+            <p:ph idx="1"/>
+          </p:nvPr>
+        </p:nvSpPr>
+        <p:spPr/>
+        <p:txBody>
+          <a:bodyPr>
+            <a:normAutofit/>
+          </a:bodyPr>
+          <a:lstStyle/>
+          <a:p>
+            <a:r>
+              <a:rPr lang="en-US" dirty="0"/>
+              <a:t>Business Implications: </a:t>
+            </a:r>
+          </a:p>
+          <a:p>
+            <a:pPr lvl="1"/>
+            <a:r>
+              <a:rPr lang="en-US" dirty="0"/>
+              <a:t>What music should artists produce? </a:t>
+            </a:r>
+          </a:p>
+          <a:p>
+            <a:pPr lvl="1"/>
+            <a:r>
+              <a:rPr lang="en-US" dirty="0"/>
+              <a:t>What music should be marketed? </a:t>
+            </a:r>
+          </a:p>
+          <a:p>
+            <a:pPr lvl="1"/>
+            <a:r>
+              <a:rPr lang="en-US" dirty="0"/>
+              <a:t>Can we accurately filter songs based on Vader (i.e. are they clean or explicit lyrics)?</a:t>
+            </a:r>
+          </a:p>
+          <a:p>
+            <a:pPr lvl="1"/>
+            <a:r>
+              <a:rPr lang="en-US" dirty="0"/>
+              <a:t>Can we exploit song lyrics to sell a product or service?</a:t>
+            </a:r>
+            <a:endParaRPr lang="en-US" dirty="0">
+              <a:hlinkClick r:id="rId2"/>
+            </a:endParaRPr>
+          </a:p>
+          <a:p>
+            <a:r>
+              <a:rPr lang="en-US" dirty="0">
+                <a:hlinkClick r:id="rId2"/>
+              </a:rPr>
+              <a:t>Vader Sentiment Analysis</a:t>
+            </a:r>
+            <a:r>
+              <a:rPr lang="en-US" dirty="0"/>
+              <a:t> https://</a:t>
+            </a:r>
+            <a:r>
+              <a:rPr lang="en-US" dirty="0" err="1"/>
+              <a:t>github.com</a:t>
+            </a:r>
+            <a:r>
+              <a:rPr lang="en-US" dirty="0"/>
+              <a:t>/</a:t>
+            </a:r>
+            <a:r>
+              <a:rPr lang="en-US" dirty="0" err="1"/>
+              <a:t>cjhutto</a:t>
+            </a:r>
+            <a:r>
+              <a:rPr lang="en-US" dirty="0"/>
+              <a:t>/</a:t>
+            </a:r>
+            <a:r>
+              <a:rPr lang="en-US" dirty="0" err="1"/>
+              <a:t>vaderSentiment</a:t>
+            </a:r>
+            <a:endParaRPr lang="en-US" dirty="0"/>
+          </a:p>
+          <a:p>
+            <a:endParaRPr lang="en-US" dirty="0"/>
+          </a:p>
+          <a:p>
+            <a:endParaRPr lang="en-US" dirty="0"/>
+          </a:p>
+          <a:p>
+            <a:endParaRPr lang="en-US" dirty="0"/>
+          </a:p>
+          <a:p>
+            <a:endParaRPr lang="en-US" dirty="0"/>
+          </a:p>
+        </p:txBody>
+      </p:sp>
+      <p:pic>
+        <p:nvPicPr>
+          <p:cNvPr id="7" name="Picture 6">
+            <a:extLst>
+              <a:ext uri="{FF2B5EF4-FFF2-40B4-BE49-F238E27FC236}">
+                <a16:creationId xmlns:a16="http://schemas.microsoft.com/office/drawing/2014/main" id="{84CC836A-4B95-3544-A20F-00037AB1948B}"/>
+              </a:ext>
+            </a:extLst>
+          </p:cNvPr>
+          <p:cNvPicPr>
+            <a:picLocks noChangeAspect="1"/>
+          </p:cNvPicPr>
+          <p:nvPr/>
+        </p:nvPicPr>
+        <p:blipFill>
+          <a:blip r:embed="rId3"/>
+          <a:stretch>
+            <a:fillRect/>
+          </a:stretch>
+        </p:blipFill>
+        <p:spPr>
+          <a:xfrm>
+            <a:off x="943997" y="5561537"/>
+            <a:ext cx="9086508" cy="459318"/>
+          </a:xfrm>
+          <a:prstGeom prst="rect">
+            <a:avLst/>
+          </a:prstGeom>
+        </p:spPr>
+      </p:pic>
+    </p:spTree>
+    <p:extLst>
+      <p:ext uri="{BB962C8B-B14F-4D97-AF65-F5344CB8AC3E}">
+        <p14:creationId xmlns:p14="http://schemas.microsoft.com/office/powerpoint/2010/main" val="4248478772"/>
+      </p:ext>
+    </p:extLst>
+  </p:cSld>
+  <p:clrMapOvr>
+    <a:masterClrMapping/>
+  </p:clrMapOvr>
+</p:sld>
+</file>
+
+<file path=ppt/slides/slide13.xml><?xml version="1.0" encoding="utf-8"?>
+<p:sld xmlns:a="http://schemas.openxmlformats.org/drawingml/2006/main" xmlns:r="http://schemas.openxmlformats.org/officeDocument/2006/relationships" xmlns:p="http://schemas.openxmlformats.org/presentationml/2006/main">
+  <p:cSld>
+    <p:spTree>
+      <p:nvGrpSpPr>
+        <p:cNvPr id="1" name=""/>
+        <p:cNvGrpSpPr/>
+        <p:nvPr/>
+      </p:nvGrpSpPr>
+      <p:grpSpPr>
+        <a:xfrm>
+          <a:off x="0" y="0"/>
+          <a:ext cx="0" cy="0"/>
+          <a:chOff x="0" y="0"/>
+          <a:chExt cx="0" cy="0"/>
+        </a:xfrm>
+      </p:grpSpPr>
+      <p:sp>
+        <p:nvSpPr>
+          <p:cNvPr id="2" name="Title 1">
+            <a:extLst>
+              <a:ext uri="{FF2B5EF4-FFF2-40B4-BE49-F238E27FC236}">
                 <a16:creationId xmlns:a16="http://schemas.microsoft.com/office/drawing/2014/main" id="{74B249B0-CC0F-A04D-B5B1-092727A16ABB}"/>
               </a:ext>
             </a:extLst>
@@ -8350,7 +8932,12 @@
             <p:ph idx="1"/>
           </p:nvPr>
         </p:nvSpPr>
-        <p:spPr/>
+        <p:spPr>
+          <a:xfrm>
+            <a:off x="680321" y="2336872"/>
+            <a:ext cx="9613861" cy="4243810"/>
+          </a:xfrm>
+        </p:spPr>
         <p:txBody>
           <a:bodyPr>
             <a:normAutofit/>
@@ -8368,7 +8955,7 @@
           <a:p>
             <a:r>
               <a:rPr lang="en-US" sz="2800" dirty="0"/>
-              <a:t>Can we “measure” society’s attitude by using Vader Sentiment Analysis on popular songs?</a:t>
+              <a:t>Can we “measure” society’s attitude by using Vader Sentiment Analysis on popular songs? And, Is Vader appropriate to analyze music lyrics?</a:t>
             </a:r>
           </a:p>
           <a:p>
@@ -8377,7 +8964,7 @@
           <a:p>
             <a:r>
               <a:rPr lang="en-US" sz="2800" dirty="0"/>
-              <a:t>Additionally, are pop songs becoming more positive or more negative over time from our starting point? </a:t>
+              <a:t>Additionally, are pop songs becoming more positive or negative over time and can we explain those changes using, for example, the economy? </a:t>
             </a:r>
           </a:p>
         </p:txBody>
@@ -8456,37 +9043,42 @@
             <p:ph idx="1"/>
           </p:nvPr>
         </p:nvSpPr>
-        <p:spPr/>
+        <p:spPr>
+          <a:xfrm>
+            <a:off x="680321" y="2336873"/>
+            <a:ext cx="10173946" cy="4030060"/>
+          </a:xfrm>
+        </p:spPr>
         <p:txBody>
           <a:bodyPr>
-            <a:normAutofit lnSpcReduction="10000"/>
+            <a:normAutofit fontScale="92500" lnSpcReduction="20000"/>
           </a:bodyPr>
           <a:lstStyle/>
           <a:p>
+            <a:r>
+              <a:rPr lang="en-US" sz="3600" dirty="0"/>
+              <a:t>Research Claim: Within the Top 100 Billboard, song lyrics have positively or negatively changed over time. </a:t>
+            </a:r>
+          </a:p>
+          <a:p>
             <a:pPr marL="0" indent="0">
               <a:buNone/>
             </a:pPr>
-            <a:endParaRPr lang="en-US" sz="3200" dirty="0"/>
-          </a:p>
-          <a:p>
-            <a:r>
-              <a:rPr lang="en-US" sz="3200" dirty="0"/>
-              <a:t>Hypothesis: Pop song lyrics have positively or negatively changed over time</a:t>
-            </a:r>
-          </a:p>
-          <a:p>
-            <a:endParaRPr lang="en-US" sz="3200" dirty="0"/>
-          </a:p>
-          <a:p>
-            <a:pPr marL="0" indent="0">
-              <a:buNone/>
-            </a:pPr>
-            <a:endParaRPr lang="en-US" sz="3200" dirty="0"/>
-          </a:p>
-          <a:p>
-            <a:r>
-              <a:rPr lang="en-US" sz="3200" dirty="0"/>
-              <a:t>Null Hypothesis: Pop song lyrics have not changed over time</a:t>
+            <a:endParaRPr lang="en-US" sz="3600" dirty="0"/>
+          </a:p>
+          <a:p>
+            <a:r>
+              <a:rPr lang="en-US" sz="3600" dirty="0"/>
+              <a:t>Null Hypothesis: Within the Top 100 Billboard, song lyrics have not changed over time</a:t>
+            </a:r>
+          </a:p>
+          <a:p>
+            <a:endParaRPr lang="en-US" sz="3600" dirty="0"/>
+          </a:p>
+          <a:p>
+            <a:r>
+              <a:rPr lang="en-US" sz="3600" dirty="0"/>
+              <a:t>Alternate Hypothesis: Within the Top 100 Billboard, song lyrics have significantly changed over time.</a:t>
             </a:r>
           </a:p>
         </p:txBody>
@@ -8565,16 +9157,21 @@
             <p:ph idx="1"/>
           </p:nvPr>
         </p:nvSpPr>
-        <p:spPr/>
+        <p:spPr>
+          <a:xfrm>
+            <a:off x="680321" y="2336872"/>
+            <a:ext cx="9613861" cy="4114727"/>
+          </a:xfrm>
+        </p:spPr>
         <p:txBody>
           <a:bodyPr>
-            <a:normAutofit/>
+            <a:normAutofit fontScale="92500" lnSpcReduction="10000"/>
           </a:bodyPr>
           <a:lstStyle/>
           <a:p>
             <a:r>
               <a:rPr lang="en-US" sz="3200" dirty="0"/>
-              <a:t>Randomly selected week using Billboard top 200, for every year from 1960 till 2017</a:t>
+              <a:t>Our Dataset is comprised of randomly selected weeks using Billboard top 100, for every year from 1968 till 2017</a:t>
             </a:r>
           </a:p>
           <a:p>
@@ -8583,7 +9180,7 @@
           <a:p>
             <a:r>
               <a:rPr lang="en-US" sz="3200" dirty="0"/>
-              <a:t>Accessed using </a:t>
+              <a:t>This data is accessed using </a:t>
             </a:r>
             <a:r>
               <a:rPr lang="en-US" sz="3200" dirty="0">
@@ -8595,6 +9192,31 @@
               <a:rPr lang="en-US" sz="3200" dirty="0"/>
               <a:t>, a Python API for downloading Billboard Charts.</a:t>
             </a:r>
+          </a:p>
+          <a:p>
+            <a:endParaRPr lang="en-US" sz="3200" dirty="0"/>
+          </a:p>
+          <a:p>
+            <a:r>
+              <a:rPr lang="en-US" sz="3200" dirty="0"/>
+              <a:t>To find song lyrics, we used the </a:t>
+            </a:r>
+            <a:r>
+              <a:rPr lang="en-US" sz="3200" dirty="0" err="1">
+                <a:hlinkClick r:id="rId3"/>
+              </a:rPr>
+              <a:t>MusixMatch</a:t>
+            </a:r>
+            <a:r>
+              <a:rPr lang="en-US" sz="3200" dirty="0"/>
+              <a:t> API.</a:t>
+            </a:r>
+          </a:p>
+          <a:p>
+            <a:endParaRPr lang="en-US" sz="3200" dirty="0"/>
+          </a:p>
+          <a:p>
+            <a:endParaRPr lang="en-US" sz="3200" dirty="0"/>
           </a:p>
         </p:txBody>
       </p:sp>
@@ -8633,7 +9255,7 @@
           <p:cNvPr id="2" name="Title 1">
             <a:extLst>
               <a:ext uri="{FF2B5EF4-FFF2-40B4-BE49-F238E27FC236}">
-                <a16:creationId xmlns:a16="http://schemas.microsoft.com/office/drawing/2014/main" id="{E36AD635-0D27-B344-BB8F-4E6CCBD96CD2}"/>
+                <a16:creationId xmlns:a16="http://schemas.microsoft.com/office/drawing/2014/main" id="{113A6E54-6C72-9148-A0E5-5198B7FB5A0E}"/>
               </a:ext>
             </a:extLst>
           </p:cNvPr>
@@ -8651,7 +9273,7 @@
           <a:p>
             <a:r>
               <a:rPr lang="en-US" dirty="0"/>
-              <a:t>Research Flow</a:t>
+              <a:t>Dataset Limitations</a:t>
             </a:r>
           </a:p>
         </p:txBody>
@@ -8661,7 +9283,7 @@
           <p:cNvPr id="3" name="Content Placeholder 2">
             <a:extLst>
               <a:ext uri="{FF2B5EF4-FFF2-40B4-BE49-F238E27FC236}">
-                <a16:creationId xmlns:a16="http://schemas.microsoft.com/office/drawing/2014/main" id="{3143643E-7C86-5A47-BB05-FF20B34922B9}"/>
+                <a16:creationId xmlns:a16="http://schemas.microsoft.com/office/drawing/2014/main" id="{4A7D791E-6C44-7B4F-ABD1-0287AA3A1D6F}"/>
               </a:ext>
             </a:extLst>
           </p:cNvPr>
@@ -8675,39 +9297,53 @@
         <p:spPr/>
         <p:txBody>
           <a:bodyPr>
-            <a:normAutofit/>
+            <a:normAutofit fontScale="92500" lnSpcReduction="10000"/>
           </a:bodyPr>
           <a:lstStyle/>
           <a:p>
             <a:r>
-              <a:rPr lang="en-US" sz="2800" dirty="0"/>
-              <a:t>Step 1: For every year between 1960 and 2017, grab Billboard 200 songs </a:t>
-            </a:r>
-          </a:p>
-          <a:p>
-            <a:endParaRPr lang="en-US" sz="2800" dirty="0"/>
-          </a:p>
-          <a:p>
-            <a:r>
-              <a:rPr lang="en-US" sz="2800" dirty="0"/>
-              <a:t>Step 2: For each year, compute Vader Sentiment Analysis of each song lyric</a:t>
-            </a:r>
-          </a:p>
-          <a:p>
-            <a:endParaRPr lang="en-US" sz="2800" dirty="0"/>
-          </a:p>
-          <a:p>
-            <a:r>
-              <a:rPr lang="en-US" sz="2800" dirty="0"/>
-              <a:t>Step 3: Plot Vader Sentiment Scores for each year</a:t>
-            </a:r>
+              <a:rPr lang="en-US" sz="3200" dirty="0"/>
+              <a:t>The Billboard Top 100 starts at 1968 (cannot analyze songs before 1968)</a:t>
+            </a:r>
+          </a:p>
+          <a:p>
+            <a:endParaRPr lang="en-US" sz="3200" dirty="0"/>
+          </a:p>
+          <a:p>
+            <a:r>
+              <a:rPr lang="en-US" sz="3200" dirty="0" err="1"/>
+              <a:t>MusixMatch</a:t>
+            </a:r>
+            <a:r>
+              <a:rPr lang="en-US" sz="3200" dirty="0"/>
+              <a:t> only provides access to 30% of a song’s lyrics (free plan limitation).</a:t>
+            </a:r>
+          </a:p>
+          <a:p>
+            <a:endParaRPr lang="en-US" sz="3200" dirty="0"/>
+          </a:p>
+          <a:p>
+            <a:r>
+              <a:rPr lang="en-US" sz="3200" dirty="0" err="1"/>
+              <a:t>MusixMatch</a:t>
+            </a:r>
+            <a:r>
+              <a:rPr lang="en-US" sz="3200" dirty="0"/>
+              <a:t> only provides 2000 API Calls per day and 500 Lyrics display per day</a:t>
+            </a:r>
+          </a:p>
+          <a:p>
+            <a:endParaRPr lang="en-US" sz="3200" dirty="0"/>
+          </a:p>
+          <a:p>
+            <a:endParaRPr lang="en-US" sz="3200" dirty="0"/>
           </a:p>
         </p:txBody>
       </p:sp>
     </p:spTree>
     <p:extLst>
       <p:ext uri="{BB962C8B-B14F-4D97-AF65-F5344CB8AC3E}">
-        <p14:creationId xmlns:p14="http://schemas.microsoft.com/office/powerpoint/2010/main" val="1843993000"/>
+        <p14:creationId xmlns:p14="http://schemas.microsoft.com/office/powerpoint/2010/main" val="159239755"/>
       </p:ext>
     </p:extLst>
   </p:cSld>
@@ -8739,7 +9375,7 @@
           <p:cNvPr id="2" name="Title 1">
             <a:extLst>
               <a:ext uri="{FF2B5EF4-FFF2-40B4-BE49-F238E27FC236}">
-                <a16:creationId xmlns:a16="http://schemas.microsoft.com/office/drawing/2014/main" id="{3466D1F8-CF12-CA4D-AEC8-A12567B41954}"/>
+                <a16:creationId xmlns:a16="http://schemas.microsoft.com/office/drawing/2014/main" id="{CBC83CA5-D8F3-3C46-BD40-6D44B0B8EDF2}"/>
               </a:ext>
             </a:extLst>
           </p:cNvPr>
@@ -8756,22 +9392,18 @@
           <a:lstStyle/>
           <a:p>
             <a:r>
-              <a:rPr lang="en-US" dirty="0" err="1"/>
-              <a:t>Jupyter</a:t>
-            </a:r>
-            <a:r>
               <a:rPr lang="en-US" dirty="0"/>
-              <a:t> Notebook Walkthrough</a:t>
-            </a:r>
-          </a:p>
-        </p:txBody>
-      </p:sp>
-      <p:sp>
-        <p:nvSpPr>
-          <p:cNvPr id="3" name="Content Placeholder 2">
+              <a:t>Vader Sentiment Analysis Examples</a:t>
+            </a:r>
+          </a:p>
+        </p:txBody>
+      </p:sp>
+      <p:sp>
+        <p:nvSpPr>
+          <p:cNvPr id="7" name="Content Placeholder 6">
             <a:extLst>
               <a:ext uri="{FF2B5EF4-FFF2-40B4-BE49-F238E27FC236}">
-                <a16:creationId xmlns:a16="http://schemas.microsoft.com/office/drawing/2014/main" id="{D2294006-2609-D94E-BE60-709608646824}"/>
+                <a16:creationId xmlns:a16="http://schemas.microsoft.com/office/drawing/2014/main" id="{40315126-934C-4B46-91D8-A794D9822D57}"/>
               </a:ext>
             </a:extLst>
           </p:cNvPr>
@@ -8782,19 +9414,138 @@
             <p:ph idx="1"/>
           </p:nvPr>
         </p:nvSpPr>
-        <p:spPr/>
-        <p:txBody>
-          <a:bodyPr/>
+        <p:spPr>
+          <a:xfrm>
+            <a:off x="680321" y="2336873"/>
+            <a:ext cx="10529546" cy="4080860"/>
+          </a:xfrm>
+        </p:spPr>
+        <p:txBody>
+          <a:bodyPr>
+            <a:normAutofit/>
+          </a:bodyPr>
           <a:lstStyle/>
           <a:p>
-            <a:endParaRPr lang="en-US"/>
-          </a:p>
-        </p:txBody>
-      </p:sp>
+            <a:r>
+              <a:rPr lang="en-US" sz="3200" dirty="0"/>
+              <a:t>Your Momma = </a:t>
+            </a:r>
+            <a:r>
+              <a:rPr lang="en-US" sz="3200" dirty="0" err="1"/>
+              <a:t>analyzer.polarity_scores</a:t>
+            </a:r>
+            <a:r>
+              <a:rPr lang="en-US" sz="3200" dirty="0"/>
+              <a:t>('your mom is a dog’)</a:t>
+            </a:r>
+          </a:p>
+          <a:p>
+            <a:endParaRPr lang="en-US" sz="3200" dirty="0"/>
+          </a:p>
+          <a:p>
+            <a:r>
+              <a:rPr lang="en-US" sz="3200" dirty="0"/>
+              <a:t>N.W.A. = </a:t>
+            </a:r>
+            <a:r>
+              <a:rPr lang="en-US" sz="3200" dirty="0" err="1"/>
+              <a:t>analyzer.polarity_scores</a:t>
+            </a:r>
+            <a:r>
+              <a:rPr lang="en-US" sz="3200" dirty="0"/>
+              <a:t>("F*** that shit, </a:t>
+            </a:r>
+            <a:r>
+              <a:rPr lang="en-US" sz="3200" dirty="0" err="1"/>
+              <a:t>'cause</a:t>
+            </a:r>
+            <a:r>
+              <a:rPr lang="en-US" sz="3200" dirty="0"/>
+              <a:t> I </a:t>
+            </a:r>
+            <a:r>
+              <a:rPr lang="en-US" sz="3200" dirty="0" err="1"/>
+              <a:t>ain't</a:t>
+            </a:r>
+            <a:r>
+              <a:rPr lang="en-US" sz="3200" dirty="0"/>
+              <a:t> the one, for a punk mother****</a:t>
+            </a:r>
+            <a:r>
+              <a:rPr lang="en-US" sz="3200" dirty="0" err="1"/>
+              <a:t>er</a:t>
+            </a:r>
+            <a:r>
+              <a:rPr lang="en-US" sz="3200" dirty="0"/>
+              <a:t> with a badge and a gun, to be beating on, and thrown in jail, We can go toe to toe in the middle of a cell")</a:t>
+            </a:r>
+          </a:p>
+        </p:txBody>
+      </p:sp>
+      <p:pic>
+        <p:nvPicPr>
+          <p:cNvPr id="9" name="Picture 8">
+            <a:extLst>
+              <a:ext uri="{FF2B5EF4-FFF2-40B4-BE49-F238E27FC236}">
+                <a16:creationId xmlns:a16="http://schemas.microsoft.com/office/drawing/2014/main" id="{7077EECC-60E7-9640-96EC-97DE2642DD59}"/>
+              </a:ext>
+            </a:extLst>
+          </p:cNvPr>
+          <p:cNvPicPr>
+            <a:picLocks noChangeAspect="1"/>
+          </p:cNvPicPr>
+          <p:nvPr/>
+        </p:nvPicPr>
+        <p:blipFill>
+          <a:blip r:embed="rId2"/>
+          <a:stretch>
+            <a:fillRect/>
+          </a:stretch>
+        </p:blipFill>
+        <p:spPr>
+          <a:xfrm>
+            <a:off x="1013883" y="3318934"/>
+            <a:ext cx="10454436" cy="393764"/>
+          </a:xfrm>
+          <a:prstGeom prst="rect">
+            <a:avLst/>
+          </a:prstGeom>
+        </p:spPr>
+      </p:pic>
+      <p:pic>
+        <p:nvPicPr>
+          <p:cNvPr id="11" name="Picture 10">
+            <a:extLst>
+              <a:ext uri="{FF2B5EF4-FFF2-40B4-BE49-F238E27FC236}">
+                <a16:creationId xmlns:a16="http://schemas.microsoft.com/office/drawing/2014/main" id="{EABC4CAB-DB9F-4646-BE55-B396159AF5AD}"/>
+              </a:ext>
+            </a:extLst>
+          </p:cNvPr>
+          <p:cNvPicPr>
+            <a:picLocks noChangeAspect="1"/>
+          </p:cNvPicPr>
+          <p:nvPr/>
+        </p:nvPicPr>
+        <p:blipFill>
+          <a:blip r:embed="rId3"/>
+          <a:stretch>
+            <a:fillRect/>
+          </a:stretch>
+        </p:blipFill>
+        <p:spPr>
+          <a:xfrm>
+            <a:off x="1013881" y="5795466"/>
+            <a:ext cx="10454437" cy="334401"/>
+          </a:xfrm>
+          <a:prstGeom prst="rect">
+            <a:avLst/>
+          </a:prstGeom>
+        </p:spPr>
+      </p:pic>
     </p:spTree>
     <p:extLst>
       <p:ext uri="{BB962C8B-B14F-4D97-AF65-F5344CB8AC3E}">
-        <p14:creationId xmlns:p14="http://schemas.microsoft.com/office/powerpoint/2010/main" val="1573595174"/>
+        <p14:creationId xmlns:p14="http://schemas.microsoft.com/office/powerpoint/2010/main" val="469012587"/>
       </p:ext>
     </p:extLst>
   </p:cSld>
@@ -8826,7 +9577,7 @@
           <p:cNvPr id="2" name="Title 1">
             <a:extLst>
               <a:ext uri="{FF2B5EF4-FFF2-40B4-BE49-F238E27FC236}">
-                <a16:creationId xmlns:a16="http://schemas.microsoft.com/office/drawing/2014/main" id="{6D3BBD76-F2F9-6647-A495-7818A8CE541A}"/>
+                <a16:creationId xmlns:a16="http://schemas.microsoft.com/office/drawing/2014/main" id="{08267B17-143F-C340-AFE8-B1E1E6812433}"/>
               </a:ext>
             </a:extLst>
           </p:cNvPr>
@@ -8844,7 +9595,7 @@
           <a:p>
             <a:r>
               <a:rPr lang="en-US" dirty="0"/>
-              <a:t>Results</a:t>
+              <a:t>Examples Cont’d</a:t>
             </a:r>
           </a:p>
         </p:txBody>
@@ -8854,7 +9605,7 @@
           <p:cNvPr id="3" name="Content Placeholder 2">
             <a:extLst>
               <a:ext uri="{FF2B5EF4-FFF2-40B4-BE49-F238E27FC236}">
-                <a16:creationId xmlns:a16="http://schemas.microsoft.com/office/drawing/2014/main" id="{A0408887-0C2A-A948-8614-440236A0BA58}"/>
+                <a16:creationId xmlns:a16="http://schemas.microsoft.com/office/drawing/2014/main" id="{AD5086F5-DAF4-D147-93A6-9BFA78E18AF5}"/>
               </a:ext>
             </a:extLst>
           </p:cNvPr>
@@ -8865,19 +9616,122 @@
             <p:ph idx="1"/>
           </p:nvPr>
         </p:nvSpPr>
-        <p:spPr/>
-        <p:txBody>
-          <a:bodyPr/>
+        <p:spPr>
+          <a:xfrm>
+            <a:off x="680321" y="1998133"/>
+            <a:ext cx="10478746" cy="4639734"/>
+          </a:xfrm>
+        </p:spPr>
+        <p:txBody>
+          <a:bodyPr>
+            <a:normAutofit/>
+          </a:bodyPr>
           <a:lstStyle/>
           <a:p>
-            <a:endParaRPr lang="en-US"/>
-          </a:p>
-        </p:txBody>
-      </p:sp>
+            <a:r>
+              <a:rPr lang="en-US" sz="2800" dirty="0"/>
+              <a:t>Happy = </a:t>
+            </a:r>
+            <a:r>
+              <a:rPr lang="en-US" sz="2800" dirty="0" err="1"/>
+              <a:t>analyzer.polarity_scores</a:t>
+            </a:r>
+            <a:r>
+              <a:rPr lang="en-US" sz="2800" dirty="0"/>
+              <a:t>("Huh, because I'm happy, Clap along if you feel like a room without a roof, Because I'm happy Clap along if you feel like happiness is the truth, Because I'm happy Clap along if you know what happiness is to you, Because I'm happy Clap along if you feel like that's what you </a:t>
+            </a:r>
+            <a:r>
+              <a:rPr lang="en-US" sz="2800" dirty="0" err="1"/>
+              <a:t>wanna</a:t>
+            </a:r>
+            <a:r>
+              <a:rPr lang="en-US" sz="2800" dirty="0"/>
+              <a:t> do")</a:t>
+            </a:r>
+          </a:p>
+          <a:p>
+            <a:endParaRPr lang="en-US" sz="2800" dirty="0"/>
+          </a:p>
+          <a:p>
+            <a:r>
+              <a:rPr lang="en-US" sz="2800" dirty="0"/>
+              <a:t>Barney = </a:t>
+            </a:r>
+            <a:r>
+              <a:rPr lang="en-US" sz="2800" dirty="0" err="1"/>
+              <a:t>analyzer.polarity_scores</a:t>
+            </a:r>
+            <a:r>
+              <a:rPr lang="en-US" sz="2800" dirty="0"/>
+              <a:t>("I love you, you love me, we're a happy family, with a great big hug and a kiss from me to you")</a:t>
+            </a:r>
+          </a:p>
+        </p:txBody>
+      </p:sp>
+      <p:pic>
+        <p:nvPicPr>
+          <p:cNvPr id="5" name="Picture 4">
+            <a:extLst>
+              <a:ext uri="{FF2B5EF4-FFF2-40B4-BE49-F238E27FC236}">
+                <a16:creationId xmlns:a16="http://schemas.microsoft.com/office/drawing/2014/main" id="{8E5C21CD-0277-2645-A298-BD493213273B}"/>
+              </a:ext>
+            </a:extLst>
+          </p:cNvPr>
+          <p:cNvPicPr>
+            <a:picLocks noChangeAspect="1"/>
+          </p:cNvPicPr>
+          <p:nvPr/>
+        </p:nvPicPr>
+        <p:blipFill>
+          <a:blip r:embed="rId2"/>
+          <a:stretch>
+            <a:fillRect/>
+          </a:stretch>
+        </p:blipFill>
+        <p:spPr>
+          <a:xfrm>
+            <a:off x="967315" y="4512770"/>
+            <a:ext cx="10222007" cy="347097"/>
+          </a:xfrm>
+          <a:prstGeom prst="rect">
+            <a:avLst/>
+          </a:prstGeom>
+        </p:spPr>
+      </p:pic>
+      <p:pic>
+        <p:nvPicPr>
+          <p:cNvPr id="7" name="Picture 6">
+            <a:extLst>
+              <a:ext uri="{FF2B5EF4-FFF2-40B4-BE49-F238E27FC236}">
+                <a16:creationId xmlns:a16="http://schemas.microsoft.com/office/drawing/2014/main" id="{45667858-20E4-3148-AB09-90FF7CF3E28A}"/>
+              </a:ext>
+            </a:extLst>
+          </p:cNvPr>
+          <p:cNvPicPr>
+            <a:picLocks noChangeAspect="1"/>
+          </p:cNvPicPr>
+          <p:nvPr/>
+        </p:nvPicPr>
+        <p:blipFill>
+          <a:blip r:embed="rId3"/>
+          <a:stretch>
+            <a:fillRect/>
+          </a:stretch>
+        </p:blipFill>
+        <p:spPr>
+          <a:xfrm>
+            <a:off x="967315" y="6239933"/>
+            <a:ext cx="10222008" cy="414406"/>
+          </a:xfrm>
+          <a:prstGeom prst="rect">
+            <a:avLst/>
+          </a:prstGeom>
+        </p:spPr>
+      </p:pic>
     </p:spTree>
     <p:extLst>
       <p:ext uri="{BB962C8B-B14F-4D97-AF65-F5344CB8AC3E}">
-        <p14:creationId xmlns:p14="http://schemas.microsoft.com/office/powerpoint/2010/main" val="1496611569"/>
+        <p14:creationId xmlns:p14="http://schemas.microsoft.com/office/powerpoint/2010/main" val="3244512335"/>
       </p:ext>
     </p:extLst>
   </p:cSld>
@@ -8909,7 +9763,7 @@
           <p:cNvPr id="2" name="Title 1">
             <a:extLst>
               <a:ext uri="{FF2B5EF4-FFF2-40B4-BE49-F238E27FC236}">
-                <a16:creationId xmlns:a16="http://schemas.microsoft.com/office/drawing/2014/main" id="{F9FEC0AD-89F0-684F-A816-C7B640FAE068}"/>
+                <a16:creationId xmlns:a16="http://schemas.microsoft.com/office/drawing/2014/main" id="{E36AD635-0D27-B344-BB8F-4E6CCBD96CD2}"/>
               </a:ext>
             </a:extLst>
           </p:cNvPr>
@@ -8927,7 +9781,7 @@
           <a:p>
             <a:r>
               <a:rPr lang="en-US" dirty="0"/>
-              <a:t>Reject or Fail to Reject Null Hypothesis?</a:t>
+              <a:t>Research Flow</a:t>
             </a:r>
           </a:p>
         </p:txBody>
@@ -8937,7 +9791,7 @@
           <p:cNvPr id="3" name="Content Placeholder 2">
             <a:extLst>
               <a:ext uri="{FF2B5EF4-FFF2-40B4-BE49-F238E27FC236}">
-                <a16:creationId xmlns:a16="http://schemas.microsoft.com/office/drawing/2014/main" id="{732679F2-AC96-6A43-AF67-78466BFBF50F}"/>
+                <a16:creationId xmlns:a16="http://schemas.microsoft.com/office/drawing/2014/main" id="{3143643E-7C86-5A47-BB05-FF20B34922B9}"/>
               </a:ext>
             </a:extLst>
           </p:cNvPr>
@@ -8948,19 +9802,47 @@
             <p:ph idx="1"/>
           </p:nvPr>
         </p:nvSpPr>
-        <p:spPr/>
-        <p:txBody>
-          <a:bodyPr/>
+        <p:spPr>
+          <a:xfrm>
+            <a:off x="680321" y="2336873"/>
+            <a:ext cx="10275546" cy="4131660"/>
+          </a:xfrm>
+        </p:spPr>
+        <p:txBody>
+          <a:bodyPr>
+            <a:normAutofit lnSpcReduction="10000"/>
+          </a:bodyPr>
           <a:lstStyle/>
           <a:p>
-            <a:endParaRPr lang="en-US"/>
+            <a:r>
+              <a:rPr lang="en-US" sz="3200" dirty="0"/>
+              <a:t>Step 1: For every year between 1968 and 2017, grab Billboard top 100 songs from a randomly selected week.</a:t>
+            </a:r>
+          </a:p>
+          <a:p>
+            <a:endParaRPr lang="en-US" sz="3200" dirty="0"/>
+          </a:p>
+          <a:p>
+            <a:r>
+              <a:rPr lang="en-US" sz="3200" dirty="0"/>
+              <a:t>Step 2: For each year, retrieve lyrics for each song and compute Vader score. Find mean Vader scores for each year.</a:t>
+            </a:r>
+          </a:p>
+          <a:p>
+            <a:endParaRPr lang="en-US" sz="3200" dirty="0"/>
+          </a:p>
+          <a:p>
+            <a:r>
+              <a:rPr lang="en-US" sz="3200" dirty="0"/>
+              <a:t>Step 3: Plot Vader Sentiment Scores for each year.</a:t>
+            </a:r>
           </a:p>
         </p:txBody>
       </p:sp>
     </p:spTree>
     <p:extLst>
       <p:ext uri="{BB962C8B-B14F-4D97-AF65-F5344CB8AC3E}">
-        <p14:creationId xmlns:p14="http://schemas.microsoft.com/office/powerpoint/2010/main" val="3907452845"/>
+        <p14:creationId xmlns:p14="http://schemas.microsoft.com/office/powerpoint/2010/main" val="1843993000"/>
       </p:ext>
     </p:extLst>
   </p:cSld>
@@ -8992,7 +9874,7 @@
           <p:cNvPr id="2" name="Title 1">
             <a:extLst>
               <a:ext uri="{FF2B5EF4-FFF2-40B4-BE49-F238E27FC236}">
-                <a16:creationId xmlns:a16="http://schemas.microsoft.com/office/drawing/2014/main" id="{34F24FD5-B0AB-C041-B203-48C6B00C06CE}"/>
+                <a16:creationId xmlns:a16="http://schemas.microsoft.com/office/drawing/2014/main" id="{3466D1F8-CF12-CA4D-AEC8-A12567B41954}"/>
               </a:ext>
             </a:extLst>
           </p:cNvPr>
@@ -9009,44 +9891,49 @@
           <a:lstStyle/>
           <a:p>
             <a:r>
+              <a:rPr lang="en-US" dirty="0" err="1"/>
+              <a:t>Jupyter</a:t>
+            </a:r>
+            <a:r>
               <a:rPr lang="en-US" dirty="0"/>
-              <a:t>Post Mortem and Research Limitations</a:t>
-            </a:r>
-          </a:p>
-        </p:txBody>
-      </p:sp>
-      <p:sp>
-        <p:nvSpPr>
-          <p:cNvPr id="3" name="Content Placeholder 2">
+              <a:t> Notebook Snippet</a:t>
+            </a:r>
+          </a:p>
+        </p:txBody>
+      </p:sp>
+      <p:pic>
+        <p:nvPicPr>
+          <p:cNvPr id="5" name="Content Placeholder 4">
             <a:extLst>
               <a:ext uri="{FF2B5EF4-FFF2-40B4-BE49-F238E27FC236}">
-                <a16:creationId xmlns:a16="http://schemas.microsoft.com/office/drawing/2014/main" id="{D42AB724-4389-274E-9B8F-133F50A03502}"/>
+                <a16:creationId xmlns:a16="http://schemas.microsoft.com/office/drawing/2014/main" id="{FA00E46B-91FB-FC40-85D1-5FC9DEAFB7F7}"/>
               </a:ext>
             </a:extLst>
           </p:cNvPr>
-          <p:cNvSpPr>
-            <a:spLocks noGrp="1"/>
-          </p:cNvSpPr>
+          <p:cNvPicPr>
+            <a:picLocks noGrp="1" noChangeAspect="1"/>
+          </p:cNvPicPr>
           <p:nvPr>
             <p:ph idx="1"/>
           </p:nvPr>
-        </p:nvSpPr>
-        <p:spPr/>
-        <p:txBody>
-          <a:bodyPr/>
-          <a:lstStyle/>
-          <a:p>
-            <a:r>
-              <a:rPr lang="en-US" dirty="0"/>
-              <a:t>Vader Sentiment Analysis</a:t>
-            </a:r>
-          </a:p>
-        </p:txBody>
-      </p:sp>
+        </p:nvPicPr>
+        <p:blipFill>
+          <a:blip r:embed="rId2"/>
+          <a:stretch>
+            <a:fillRect/>
+          </a:stretch>
+        </p:blipFill>
+        <p:spPr>
+          <a:xfrm>
+            <a:off x="968187" y="2099732"/>
+            <a:ext cx="10004612" cy="4626938"/>
+          </a:xfrm>
+        </p:spPr>
+      </p:pic>
     </p:spTree>
     <p:extLst>
       <p:ext uri="{BB962C8B-B14F-4D97-AF65-F5344CB8AC3E}">
-        <p14:creationId xmlns:p14="http://schemas.microsoft.com/office/powerpoint/2010/main" val="4248478772"/>
+        <p14:creationId xmlns:p14="http://schemas.microsoft.com/office/powerpoint/2010/main" val="1573595174"/>
       </p:ext>
     </p:extLst>
   </p:cSld>

</xml_diff>